<commit_message>
Power Point Bemutató frissítve
</commit_message>
<xml_diff>
--- a/etelfutar_ppt_uj.pptx
+++ b/etelfutar_ppt_uj.pptx
@@ -19,6 +19,8 @@
     <p:sldId id="264" r:id="rId14"/>
     <p:sldId id="265" r:id="rId15"/>
     <p:sldId id="266" r:id="rId16"/>
+    <p:sldId id="267" r:id="rId17"/>
+    <p:sldId id="268" r:id="rId18"/>
   </p:sldIdLst>
   <p:sldSz cy="5143500" cx="9144000"/>
   <p:notesSz cx="6858000" cy="9144000"/>
@@ -967,7 +969,7 @@
       </p:grpSpPr>
       <p:sp>
         <p:nvSpPr>
-          <p:cNvPr id="106" name="Google Shape;106;p9:notes"/>
+          <p:cNvPr id="106" name="Google Shape;106;p10:notes"/>
           <p:cNvSpPr/>
           <p:nvPr>
             <p:ph idx="2" type="sldImg"/>
@@ -1012,7 +1014,7 @@
       </p:sp>
       <p:sp>
         <p:nvSpPr>
-          <p:cNvPr id="107" name="Google Shape;107;p9:notes"/>
+          <p:cNvPr id="107" name="Google Shape;107;p10:notes"/>
           <p:cNvSpPr txBox="1"/>
           <p:nvPr>
             <p:ph idx="1" type="body"/>
@@ -1084,7 +1086,7 @@
       </p:grpSpPr>
       <p:sp>
         <p:nvSpPr>
-          <p:cNvPr id="112" name="Google Shape;112;p10:notes"/>
+          <p:cNvPr id="112" name="Google Shape;112;p11:notes"/>
           <p:cNvSpPr/>
           <p:nvPr>
             <p:ph idx="2" type="sldImg"/>
@@ -1129,7 +1131,241 @@
       </p:sp>
       <p:sp>
         <p:nvSpPr>
-          <p:cNvPr id="113" name="Google Shape;113;p10:notes"/>
+          <p:cNvPr id="113" name="Google Shape;113;p11:notes"/>
+          <p:cNvSpPr txBox="1"/>
+          <p:nvPr>
+            <p:ph idx="1" type="body"/>
+          </p:nvPr>
+        </p:nvSpPr>
+        <p:spPr>
+          <a:xfrm>
+            <a:off x="685800" y="4343400"/>
+            <a:ext cx="5486400" cy="4114800"/>
+          </a:xfrm>
+          <a:prstGeom prst="rect">
+            <a:avLst/>
+          </a:prstGeom>
+          <a:noFill/>
+          <a:ln>
+            <a:noFill/>
+          </a:ln>
+        </p:spPr>
+        <p:txBody>
+          <a:bodyPr anchorCtr="0" anchor="t" bIns="91425" lIns="91425" spcFirstLastPara="1" rIns="91425" wrap="square" tIns="91425">
+            <a:noAutofit/>
+          </a:bodyPr>
+          <a:lstStyle/>
+          <a:p>
+            <a:pPr indent="0" lvl="0" marL="0" rtl="0" algn="l">
+              <a:lnSpc>
+                <a:spcPct val="100000"/>
+              </a:lnSpc>
+              <a:spcBef>
+                <a:spcPts val="0"/>
+              </a:spcBef>
+              <a:spcAft>
+                <a:spcPts val="0"/>
+              </a:spcAft>
+              <a:buSzPts val="1100"/>
+              <a:buNone/>
+            </a:pPr>
+            <a:r>
+              <a:t/>
+            </a:r>
+            <a:endParaRPr/>
+          </a:p>
+        </p:txBody>
+      </p:sp>
+    </p:spTree>
+  </p:cSld>
+  <p:clrMapOvr>
+    <a:masterClrMapping/>
+  </p:clrMapOvr>
+</p:notes>
+</file>
+
+<file path=ppt/notesSlides/notesSlide12.xml><?xml version="1.0" encoding="utf-8"?>
+<p:notes xmlns:a="http://schemas.openxmlformats.org/drawingml/2006/main" xmlns:r="http://schemas.openxmlformats.org/officeDocument/2006/relationships" xmlns:mc="http://schemas.openxmlformats.org/markup-compatibility/2006" xmlns:mv="urn:schemas-microsoft-com:mac:vml" xmlns:p="http://schemas.openxmlformats.org/presentationml/2006/main" xmlns:c="http://schemas.openxmlformats.org/drawingml/2006/chart" xmlns:dgm="http://schemas.openxmlformats.org/drawingml/2006/diagram" xmlns:o="urn:schemas-microsoft-com:office:office" xmlns:v="urn:schemas-microsoft-com:vml" xmlns:pvml="urn:schemas-microsoft-com:office:powerpoint" xmlns:com="http://schemas.openxmlformats.org/drawingml/2006/compatibility" xmlns:p14="http://schemas.microsoft.com/office/powerpoint/2010/main" xmlns:p15="http://schemas.microsoft.com/office/powerpoint/2012/main" xmlns:ahyp="http://schemas.microsoft.com/office/drawing/2018/hyperlinkcolor" showMasterPhAnim="0" showMasterSp="0">
+  <p:cSld>
+    <p:spTree>
+      <p:nvGrpSpPr>
+        <p:cNvPr id="117" name="Shape 117"/>
+        <p:cNvGrpSpPr/>
+        <p:nvPr/>
+      </p:nvGrpSpPr>
+      <p:grpSpPr>
+        <a:xfrm>
+          <a:off x="0" y="0"/>
+          <a:ext cx="0" cy="0"/>
+          <a:chOff x="0" y="0"/>
+          <a:chExt cx="0" cy="0"/>
+        </a:xfrm>
+      </p:grpSpPr>
+      <p:sp>
+        <p:nvSpPr>
+          <p:cNvPr id="118" name="Google Shape;118;g32fcb92857c_0_0:notes"/>
+          <p:cNvSpPr/>
+          <p:nvPr>
+            <p:ph idx="2" type="sldImg"/>
+          </p:nvPr>
+        </p:nvSpPr>
+        <p:spPr>
+          <a:xfrm>
+            <a:off x="381300" y="685800"/>
+            <a:ext cx="6096000" cy="3429000"/>
+          </a:xfrm>
+          <a:custGeom>
+            <a:rect b="b" l="l" r="r" t="t"/>
+            <a:pathLst>
+              <a:path extrusionOk="0" h="120000" w="120000">
+                <a:moveTo>
+                  <a:pt x="0" y="0"/>
+                </a:moveTo>
+                <a:lnTo>
+                  <a:pt x="120000" y="0"/>
+                </a:lnTo>
+                <a:lnTo>
+                  <a:pt x="120000" y="120000"/>
+                </a:lnTo>
+                <a:lnTo>
+                  <a:pt x="0" y="120000"/>
+                </a:lnTo>
+                <a:close/>
+              </a:path>
+            </a:pathLst>
+          </a:custGeom>
+          <a:noFill/>
+          <a:ln cap="flat" cmpd="sng" w="9525">
+            <a:solidFill>
+              <a:srgbClr val="000000"/>
+            </a:solidFill>
+            <a:prstDash val="solid"/>
+            <a:round/>
+            <a:headEnd len="sm" w="sm" type="none"/>
+            <a:tailEnd len="sm" w="sm" type="none"/>
+          </a:ln>
+        </p:spPr>
+      </p:sp>
+      <p:sp>
+        <p:nvSpPr>
+          <p:cNvPr id="119" name="Google Shape;119;g32fcb92857c_0_0:notes"/>
+          <p:cNvSpPr txBox="1"/>
+          <p:nvPr>
+            <p:ph idx="1" type="body"/>
+          </p:nvPr>
+        </p:nvSpPr>
+        <p:spPr>
+          <a:xfrm>
+            <a:off x="685800" y="4343400"/>
+            <a:ext cx="5486400" cy="4114800"/>
+          </a:xfrm>
+          <a:prstGeom prst="rect">
+            <a:avLst/>
+          </a:prstGeom>
+          <a:noFill/>
+          <a:ln>
+            <a:noFill/>
+          </a:ln>
+        </p:spPr>
+        <p:txBody>
+          <a:bodyPr anchorCtr="0" anchor="t" bIns="91425" lIns="91425" spcFirstLastPara="1" rIns="91425" wrap="square" tIns="91425">
+            <a:noAutofit/>
+          </a:bodyPr>
+          <a:lstStyle/>
+          <a:p>
+            <a:pPr indent="0" lvl="0" marL="0" rtl="0" algn="l">
+              <a:lnSpc>
+                <a:spcPct val="100000"/>
+              </a:lnSpc>
+              <a:spcBef>
+                <a:spcPts val="0"/>
+              </a:spcBef>
+              <a:spcAft>
+                <a:spcPts val="0"/>
+              </a:spcAft>
+              <a:buSzPts val="1100"/>
+              <a:buNone/>
+            </a:pPr>
+            <a:r>
+              <a:t/>
+            </a:r>
+            <a:endParaRPr/>
+          </a:p>
+        </p:txBody>
+      </p:sp>
+    </p:spTree>
+  </p:cSld>
+  <p:clrMapOvr>
+    <a:masterClrMapping/>
+  </p:clrMapOvr>
+</p:notes>
+</file>
+
+<file path=ppt/notesSlides/notesSlide13.xml><?xml version="1.0" encoding="utf-8"?>
+<p:notes xmlns:a="http://schemas.openxmlformats.org/drawingml/2006/main" xmlns:r="http://schemas.openxmlformats.org/officeDocument/2006/relationships" xmlns:mc="http://schemas.openxmlformats.org/markup-compatibility/2006" xmlns:mv="urn:schemas-microsoft-com:mac:vml" xmlns:p="http://schemas.openxmlformats.org/presentationml/2006/main" xmlns:c="http://schemas.openxmlformats.org/drawingml/2006/chart" xmlns:dgm="http://schemas.openxmlformats.org/drawingml/2006/diagram" xmlns:o="urn:schemas-microsoft-com:office:office" xmlns:v="urn:schemas-microsoft-com:vml" xmlns:pvml="urn:schemas-microsoft-com:office:powerpoint" xmlns:com="http://schemas.openxmlformats.org/drawingml/2006/compatibility" xmlns:p14="http://schemas.microsoft.com/office/powerpoint/2010/main" xmlns:p15="http://schemas.microsoft.com/office/powerpoint/2012/main" xmlns:ahyp="http://schemas.microsoft.com/office/drawing/2018/hyperlinkcolor" showMasterPhAnim="0" showMasterSp="0">
+  <p:cSld>
+    <p:spTree>
+      <p:nvGrpSpPr>
+        <p:cNvPr id="123" name="Shape 123"/>
+        <p:cNvGrpSpPr/>
+        <p:nvPr/>
+      </p:nvGrpSpPr>
+      <p:grpSpPr>
+        <a:xfrm>
+          <a:off x="0" y="0"/>
+          <a:ext cx="0" cy="0"/>
+          <a:chOff x="0" y="0"/>
+          <a:chExt cx="0" cy="0"/>
+        </a:xfrm>
+      </p:grpSpPr>
+      <p:sp>
+        <p:nvSpPr>
+          <p:cNvPr id="124" name="Google Shape;124;g32fcb92857c_0_8:notes"/>
+          <p:cNvSpPr/>
+          <p:nvPr>
+            <p:ph idx="2" type="sldImg"/>
+          </p:nvPr>
+        </p:nvSpPr>
+        <p:spPr>
+          <a:xfrm>
+            <a:off x="381300" y="685800"/>
+            <a:ext cx="6096000" cy="3429000"/>
+          </a:xfrm>
+          <a:custGeom>
+            <a:rect b="b" l="l" r="r" t="t"/>
+            <a:pathLst>
+              <a:path extrusionOk="0" h="120000" w="120000">
+                <a:moveTo>
+                  <a:pt x="0" y="0"/>
+                </a:moveTo>
+                <a:lnTo>
+                  <a:pt x="120000" y="0"/>
+                </a:lnTo>
+                <a:lnTo>
+                  <a:pt x="120000" y="120000"/>
+                </a:lnTo>
+                <a:lnTo>
+                  <a:pt x="0" y="120000"/>
+                </a:lnTo>
+                <a:close/>
+              </a:path>
+            </a:pathLst>
+          </a:custGeom>
+          <a:noFill/>
+          <a:ln cap="flat" cmpd="sng" w="9525">
+            <a:solidFill>
+              <a:srgbClr val="000000"/>
+            </a:solidFill>
+            <a:prstDash val="solid"/>
+            <a:round/>
+            <a:headEnd len="sm" w="sm" type="none"/>
+            <a:tailEnd len="sm" w="sm" type="none"/>
+          </a:ln>
+        </p:spPr>
+      </p:sp>
+      <p:sp>
+        <p:nvSpPr>
+          <p:cNvPr id="125" name="Google Shape;125;g32fcb92857c_0_8:notes"/>
           <p:cNvSpPr txBox="1"/>
           <p:nvPr>
             <p:ph idx="1" type="body"/>
@@ -1552,7 +1788,7 @@
       </p:grpSpPr>
       <p:sp>
         <p:nvSpPr>
-          <p:cNvPr id="75" name="Google Shape;75;g32db9b2667c_0_0:notes"/>
+          <p:cNvPr id="75" name="Google Shape;75;p5:notes"/>
           <p:cNvSpPr/>
           <p:nvPr>
             <p:ph idx="2" type="sldImg"/>
@@ -1597,7 +1833,7 @@
       </p:sp>
       <p:sp>
         <p:nvSpPr>
-          <p:cNvPr id="76" name="Google Shape;76;g32db9b2667c_0_0:notes"/>
+          <p:cNvPr id="76" name="Google Shape;76;p5:notes"/>
           <p:cNvSpPr txBox="1"/>
           <p:nvPr>
             <p:ph idx="1" type="body"/>
@@ -1669,7 +1905,7 @@
       </p:grpSpPr>
       <p:sp>
         <p:nvSpPr>
-          <p:cNvPr id="82" name="Google Shape;82;p5:notes"/>
+          <p:cNvPr id="82" name="Google Shape;82;p6:notes"/>
           <p:cNvSpPr/>
           <p:nvPr>
             <p:ph idx="2" type="sldImg"/>
@@ -1714,7 +1950,7 @@
       </p:sp>
       <p:sp>
         <p:nvSpPr>
-          <p:cNvPr id="83" name="Google Shape;83;p5:notes"/>
+          <p:cNvPr id="83" name="Google Shape;83;p6:notes"/>
           <p:cNvSpPr txBox="1"/>
           <p:nvPr>
             <p:ph idx="1" type="body"/>
@@ -1786,7 +2022,7 @@
       </p:grpSpPr>
       <p:sp>
         <p:nvSpPr>
-          <p:cNvPr id="88" name="Google Shape;88;p6:notes"/>
+          <p:cNvPr id="88" name="Google Shape;88;p7:notes"/>
           <p:cNvSpPr/>
           <p:nvPr>
             <p:ph idx="2" type="sldImg"/>
@@ -1831,7 +2067,7 @@
       </p:sp>
       <p:sp>
         <p:nvSpPr>
-          <p:cNvPr id="89" name="Google Shape;89;p6:notes"/>
+          <p:cNvPr id="89" name="Google Shape;89;p7:notes"/>
           <p:cNvSpPr txBox="1"/>
           <p:nvPr>
             <p:ph idx="1" type="body"/>
@@ -1903,7 +2139,7 @@
       </p:grpSpPr>
       <p:sp>
         <p:nvSpPr>
-          <p:cNvPr id="94" name="Google Shape;94;p7:notes"/>
+          <p:cNvPr id="94" name="Google Shape;94;p8:notes"/>
           <p:cNvSpPr/>
           <p:nvPr>
             <p:ph idx="2" type="sldImg"/>
@@ -1948,7 +2184,7 @@
       </p:sp>
       <p:sp>
         <p:nvSpPr>
-          <p:cNvPr id="95" name="Google Shape;95;p7:notes"/>
+          <p:cNvPr id="95" name="Google Shape;95;p8:notes"/>
           <p:cNvSpPr txBox="1"/>
           <p:nvPr>
             <p:ph idx="1" type="body"/>
@@ -2020,7 +2256,7 @@
       </p:grpSpPr>
       <p:sp>
         <p:nvSpPr>
-          <p:cNvPr id="100" name="Google Shape;100;p8:notes"/>
+          <p:cNvPr id="100" name="Google Shape;100;p9:notes"/>
           <p:cNvSpPr/>
           <p:nvPr>
             <p:ph idx="2" type="sldImg"/>
@@ -2065,7 +2301,7 @@
       </p:sp>
       <p:sp>
         <p:nvSpPr>
-          <p:cNvPr id="101" name="Google Shape;101;p8:notes"/>
+          <p:cNvPr id="101" name="Google Shape;101;p9:notes"/>
           <p:cNvSpPr txBox="1"/>
           <p:nvPr>
             <p:ph idx="1" type="body"/>
@@ -9868,7 +10104,7 @@
               <a:spcAft>
                 <a:spcPts val="0"/>
               </a:spcAft>
-              <a:buSzPct val="117647"/>
+              <a:buSzPct val="117646"/>
               <a:buNone/>
             </a:pPr>
             <a:r>
@@ -10062,17 +10298,322 @@
           <p:cNvPicPr preferRelativeResize="0"/>
           <p:nvPr/>
         </p:nvPicPr>
-        <p:blipFill rotWithShape="1">
+        <p:blipFill>
           <a:blip r:embed="rId3">
             <a:alphaModFix/>
           </a:blip>
-          <a:srcRect b="0" l="0" r="0" t="0"/>
-          <a:stretch/>
+          <a:stretch>
+            <a:fillRect/>
+          </a:stretch>
         </p:blipFill>
         <p:spPr>
           <a:xfrm>
             <a:off x="152400" y="1170125"/>
-            <a:ext cx="8088504" cy="3820976"/>
+            <a:ext cx="8079595" cy="3820975"/>
+          </a:xfrm>
+          <a:prstGeom prst="rect">
+            <a:avLst/>
+          </a:prstGeom>
+          <a:noFill/>
+          <a:ln>
+            <a:noFill/>
+          </a:ln>
+        </p:spPr>
+      </p:pic>
+    </p:spTree>
+  </p:cSld>
+  <p:clrMapOvr>
+    <a:masterClrMapping/>
+  </p:clrMapOvr>
+</p:sld>
+</file>
+
+<file path=ppt/slides/slide12.xml><?xml version="1.0" encoding="utf-8"?>
+<p:sld xmlns:a="http://schemas.openxmlformats.org/drawingml/2006/main" xmlns:r="http://schemas.openxmlformats.org/officeDocument/2006/relationships" xmlns:mc="http://schemas.openxmlformats.org/markup-compatibility/2006" xmlns:mv="urn:schemas-microsoft-com:mac:vml" xmlns:p="http://schemas.openxmlformats.org/presentationml/2006/main" xmlns:c="http://schemas.openxmlformats.org/drawingml/2006/chart" xmlns:dgm="http://schemas.openxmlformats.org/drawingml/2006/diagram" xmlns:o="urn:schemas-microsoft-com:office:office" xmlns:v="urn:schemas-microsoft-com:vml" xmlns:pvml="urn:schemas-microsoft-com:office:powerpoint" xmlns:com="http://schemas.openxmlformats.org/drawingml/2006/compatibility" xmlns:p14="http://schemas.microsoft.com/office/powerpoint/2010/main" xmlns:p15="http://schemas.microsoft.com/office/powerpoint/2012/main" xmlns:ahyp="http://schemas.microsoft.com/office/drawing/2018/hyperlinkcolor">
+  <p:cSld>
+    <p:spTree>
+      <p:nvGrpSpPr>
+        <p:cNvPr id="120" name="Shape 120"/>
+        <p:cNvGrpSpPr/>
+        <p:nvPr/>
+      </p:nvGrpSpPr>
+      <p:grpSpPr>
+        <a:xfrm>
+          <a:off x="0" y="0"/>
+          <a:ext cx="0" cy="0"/>
+          <a:chOff x="0" y="0"/>
+          <a:chExt cx="0" cy="0"/>
+        </a:xfrm>
+      </p:grpSpPr>
+      <p:sp>
+        <p:nvSpPr>
+          <p:cNvPr id="121" name="Google Shape;121;p24"/>
+          <p:cNvSpPr txBox="1"/>
+          <p:nvPr>
+            <p:ph type="title"/>
+          </p:nvPr>
+        </p:nvSpPr>
+        <p:spPr>
+          <a:xfrm>
+            <a:off x="311700" y="445025"/>
+            <a:ext cx="8520600" cy="572700"/>
+          </a:xfrm>
+          <a:prstGeom prst="rect">
+            <a:avLst/>
+          </a:prstGeom>
+          <a:noFill/>
+          <a:ln>
+            <a:noFill/>
+          </a:ln>
+        </p:spPr>
+        <p:txBody>
+          <a:bodyPr anchorCtr="0" anchor="t" bIns="91425" lIns="91425" spcFirstLastPara="1" rIns="91425" wrap="square" tIns="91425">
+            <a:normAutofit fontScale="90000"/>
+          </a:bodyPr>
+          <a:lstStyle/>
+          <a:p>
+            <a:pPr indent="0" lvl="0" marL="0" rtl="0" algn="l">
+              <a:lnSpc>
+                <a:spcPct val="100000"/>
+              </a:lnSpc>
+              <a:spcBef>
+                <a:spcPts val="0"/>
+              </a:spcBef>
+              <a:spcAft>
+                <a:spcPts val="0"/>
+              </a:spcAft>
+              <a:buSzPct val="111111"/>
+              <a:buNone/>
+            </a:pPr>
+            <a:r>
+              <a:rPr lang="hu"/>
+              <a:t>Adminisztrációs felület-WPF Alkalmazás:</a:t>
+            </a:r>
+            <a:endParaRPr/>
+          </a:p>
+        </p:txBody>
+      </p:sp>
+      <p:sp>
+        <p:nvSpPr>
+          <p:cNvPr id="122" name="Google Shape;122;p24"/>
+          <p:cNvSpPr txBox="1"/>
+          <p:nvPr/>
+        </p:nvSpPr>
+        <p:spPr>
+          <a:xfrm>
+            <a:off x="311700" y="1017725"/>
+            <a:ext cx="8335500" cy="1723800"/>
+          </a:xfrm>
+          <a:prstGeom prst="rect">
+            <a:avLst/>
+          </a:prstGeom>
+          <a:noFill/>
+          <a:ln>
+            <a:noFill/>
+          </a:ln>
+        </p:spPr>
+        <p:txBody>
+          <a:bodyPr anchorCtr="0" anchor="t" bIns="91425" lIns="91425" spcFirstLastPara="1" rIns="91425" wrap="square" tIns="91425">
+            <a:spAutoFit/>
+          </a:bodyPr>
+          <a:lstStyle/>
+          <a:p>
+            <a:pPr indent="0" lvl="0" marL="0" rtl="0" algn="l">
+              <a:spcBef>
+                <a:spcPts val="0"/>
+              </a:spcBef>
+              <a:spcAft>
+                <a:spcPts val="0"/>
+              </a:spcAft>
+              <a:buNone/>
+            </a:pPr>
+            <a:r>
+              <a:rPr lang="hu" sz="2000">
+                <a:solidFill>
+                  <a:schemeClr val="dk1"/>
+                </a:solidFill>
+              </a:rPr>
+              <a:t>A WPF alkalmazás egy felhasználó kezelő program amely segítségével az “Adminisztrátor” kezelheti a felhasználóit: létrehozhat újat,törölhet,módosíthat.</a:t>
+            </a:r>
+            <a:endParaRPr sz="2000">
+              <a:solidFill>
+                <a:schemeClr val="dk1"/>
+              </a:solidFill>
+            </a:endParaRPr>
+          </a:p>
+          <a:p>
+            <a:pPr indent="0" lvl="0" marL="0" rtl="0" algn="l">
+              <a:spcBef>
+                <a:spcPts val="0"/>
+              </a:spcBef>
+              <a:spcAft>
+                <a:spcPts val="0"/>
+              </a:spcAft>
+              <a:buNone/>
+            </a:pPr>
+            <a:r>
+              <a:rPr lang="hu" sz="2000">
+                <a:solidFill>
+                  <a:schemeClr val="dk1"/>
+                </a:solidFill>
+              </a:rPr>
+              <a:t>Csak be kell jelentkezni “Admin” felhasználóként és kész. Illetve be is lehet regisztrálni egy új felhasználót.</a:t>
+            </a:r>
+            <a:endParaRPr sz="2000">
+              <a:solidFill>
+                <a:schemeClr val="dk1"/>
+              </a:solidFill>
+            </a:endParaRPr>
+          </a:p>
+        </p:txBody>
+      </p:sp>
+    </p:spTree>
+  </p:cSld>
+  <p:clrMapOvr>
+    <a:masterClrMapping/>
+  </p:clrMapOvr>
+</p:sld>
+</file>
+
+<file path=ppt/slides/slide13.xml><?xml version="1.0" encoding="utf-8"?>
+<p:sld xmlns:a="http://schemas.openxmlformats.org/drawingml/2006/main" xmlns:r="http://schemas.openxmlformats.org/officeDocument/2006/relationships" xmlns:mc="http://schemas.openxmlformats.org/markup-compatibility/2006" xmlns:mv="urn:schemas-microsoft-com:mac:vml" xmlns:p="http://schemas.openxmlformats.org/presentationml/2006/main" xmlns:c="http://schemas.openxmlformats.org/drawingml/2006/chart" xmlns:dgm="http://schemas.openxmlformats.org/drawingml/2006/diagram" xmlns:o="urn:schemas-microsoft-com:office:office" xmlns:v="urn:schemas-microsoft-com:vml" xmlns:pvml="urn:schemas-microsoft-com:office:powerpoint" xmlns:com="http://schemas.openxmlformats.org/drawingml/2006/compatibility" xmlns:p14="http://schemas.microsoft.com/office/powerpoint/2010/main" xmlns:p15="http://schemas.microsoft.com/office/powerpoint/2012/main" xmlns:ahyp="http://schemas.microsoft.com/office/drawing/2018/hyperlinkcolor">
+  <p:cSld>
+    <p:spTree>
+      <p:nvGrpSpPr>
+        <p:cNvPr id="126" name="Shape 126"/>
+        <p:cNvGrpSpPr/>
+        <p:nvPr/>
+      </p:nvGrpSpPr>
+      <p:grpSpPr>
+        <a:xfrm>
+          <a:off x="0" y="0"/>
+          <a:ext cx="0" cy="0"/>
+          <a:chOff x="0" y="0"/>
+          <a:chExt cx="0" cy="0"/>
+        </a:xfrm>
+      </p:grpSpPr>
+      <p:sp>
+        <p:nvSpPr>
+          <p:cNvPr id="127" name="Google Shape;127;p25"/>
+          <p:cNvSpPr txBox="1"/>
+          <p:nvPr>
+            <p:ph type="title"/>
+          </p:nvPr>
+        </p:nvSpPr>
+        <p:spPr>
+          <a:xfrm>
+            <a:off x="311700" y="445025"/>
+            <a:ext cx="8520600" cy="572700"/>
+          </a:xfrm>
+          <a:prstGeom prst="rect">
+            <a:avLst/>
+          </a:prstGeom>
+          <a:noFill/>
+          <a:ln>
+            <a:noFill/>
+          </a:ln>
+        </p:spPr>
+        <p:txBody>
+          <a:bodyPr anchorCtr="0" anchor="t" bIns="91425" lIns="91425" spcFirstLastPara="1" rIns="91425" wrap="square" tIns="91425">
+            <a:normAutofit fontScale="90000"/>
+          </a:bodyPr>
+          <a:lstStyle/>
+          <a:p>
+            <a:pPr indent="0" lvl="0" marL="0" rtl="0" algn="l">
+              <a:lnSpc>
+                <a:spcPct val="100000"/>
+              </a:lnSpc>
+              <a:spcBef>
+                <a:spcPts val="0"/>
+              </a:spcBef>
+              <a:spcAft>
+                <a:spcPts val="0"/>
+              </a:spcAft>
+              <a:buSzPct val="111111"/>
+              <a:buNone/>
+            </a:pPr>
+            <a:r>
+              <a:rPr lang="hu"/>
+              <a:t>WPF Alkalmazás kinézete:</a:t>
+            </a:r>
+            <a:endParaRPr/>
+          </a:p>
+        </p:txBody>
+      </p:sp>
+      <p:pic>
+        <p:nvPicPr>
+          <p:cNvPr id="128" name="Google Shape;128;p25"/>
+          <p:cNvPicPr preferRelativeResize="0"/>
+          <p:nvPr/>
+        </p:nvPicPr>
+        <p:blipFill>
+          <a:blip r:embed="rId3">
+            <a:alphaModFix/>
+          </a:blip>
+          <a:stretch>
+            <a:fillRect/>
+          </a:stretch>
+        </p:blipFill>
+        <p:spPr>
+          <a:xfrm>
+            <a:off x="311700" y="1689850"/>
+            <a:ext cx="2326806" cy="2333700"/>
+          </a:xfrm>
+          <a:prstGeom prst="rect">
+            <a:avLst/>
+          </a:prstGeom>
+          <a:noFill/>
+          <a:ln>
+            <a:noFill/>
+          </a:ln>
+        </p:spPr>
+      </p:pic>
+      <p:pic>
+        <p:nvPicPr>
+          <p:cNvPr id="129" name="Google Shape;129;p25"/>
+          <p:cNvPicPr preferRelativeResize="0"/>
+          <p:nvPr/>
+        </p:nvPicPr>
+        <p:blipFill>
+          <a:blip r:embed="rId4">
+            <a:alphaModFix/>
+          </a:blip>
+          <a:stretch>
+            <a:fillRect/>
+          </a:stretch>
+        </p:blipFill>
+        <p:spPr>
+          <a:xfrm>
+            <a:off x="3053238" y="1689840"/>
+            <a:ext cx="2691750" cy="2333711"/>
+          </a:xfrm>
+          <a:prstGeom prst="rect">
+            <a:avLst/>
+          </a:prstGeom>
+          <a:noFill/>
+          <a:ln>
+            <a:noFill/>
+          </a:ln>
+        </p:spPr>
+      </p:pic>
+      <p:pic>
+        <p:nvPicPr>
+          <p:cNvPr id="130" name="Google Shape;130;p25"/>
+          <p:cNvPicPr preferRelativeResize="0"/>
+          <p:nvPr/>
+        </p:nvPicPr>
+        <p:blipFill>
+          <a:blip r:embed="rId5">
+            <a:alphaModFix/>
+          </a:blip>
+          <a:stretch>
+            <a:fillRect/>
+          </a:stretch>
+        </p:blipFill>
+        <p:spPr>
+          <a:xfrm>
+            <a:off x="6159725" y="1689850"/>
+            <a:ext cx="2672571" cy="2333700"/>
           </a:xfrm>
           <a:prstGeom prst="rect">
             <a:avLst/>
@@ -10197,10 +10738,10 @@
               <a:buNone/>
             </a:pPr>
             <a:r>
-              <a:rPr lang="hu"/>
+              <a:rPr lang="hu" sz="2000"/>
               <a:t>Mi vagyunk az Ételfutár. Üdvözöljük weblapunkon ahol kényelmesen rendelhet ételeket Miskolci éttermekből vagy akár egyéb városok éttermeiből. Cégünk étel rendeléssel és kiszállítással foglalkozik. Csak regisztráljon és már rendelhet is ételt házhoz azonnal. A kiszállítási díjat felszámoljuk amely 1000 Ft. Viszont cserébe kényelmesen, rugalmasan és friss ételt rendelhet tőlünk.</a:t>
             </a:r>
-            <a:endParaRPr/>
+            <a:endParaRPr sz="2000"/>
           </a:p>
         </p:txBody>
       </p:sp>
@@ -10288,7 +10829,7 @@
         <p:spPr>
           <a:xfrm>
             <a:off x="311700" y="1152475"/>
-            <a:ext cx="8520600" cy="3416400"/>
+            <a:ext cx="8520600" cy="3886500"/>
           </a:xfrm>
           <a:prstGeom prst="rect">
             <a:avLst/>
@@ -10300,21 +10841,21 @@
         </p:spPr>
         <p:txBody>
           <a:bodyPr anchorCtr="0" anchor="t" bIns="91425" lIns="91425" spcFirstLastPara="1" rIns="91425" wrap="square" tIns="91425">
-            <a:normAutofit fontScale="92500" lnSpcReduction="10000"/>
+            <a:noAutofit/>
           </a:bodyPr>
           <a:lstStyle/>
           <a:p>
             <a:pPr indent="0" lvl="0" marL="0" rtl="0" algn="l">
               <a:lnSpc>
-                <a:spcPct val="115000"/>
-              </a:lnSpc>
-              <a:spcBef>
-                <a:spcPts val="0"/>
-              </a:spcBef>
-              <a:spcAft>
-                <a:spcPts val="0"/>
-              </a:spcAft>
-              <a:buSzPct val="100000"/>
+                <a:spcPct val="105000"/>
+              </a:lnSpc>
+              <a:spcBef>
+                <a:spcPts val="0"/>
+              </a:spcBef>
+              <a:spcAft>
+                <a:spcPts val="0"/>
+              </a:spcAft>
+              <a:buSzPts val="1665"/>
               <a:buNone/>
             </a:pPr>
             <a:r>
@@ -10326,7 +10867,7 @@
           <a:p>
             <a:pPr indent="0" lvl="0" marL="0" rtl="0" algn="l">
               <a:lnSpc>
-                <a:spcPct val="115000"/>
+                <a:spcPct val="105000"/>
               </a:lnSpc>
               <a:spcBef>
                 <a:spcPts val="1200"/>
@@ -10334,7 +10875,7 @@
               <a:spcAft>
                 <a:spcPts val="0"/>
               </a:spcAft>
-              <a:buSzPct val="100000"/>
+              <a:buSzPts val="1665"/>
               <a:buNone/>
             </a:pPr>
             <a:r>
@@ -10346,7 +10887,7 @@
           <a:p>
             <a:pPr indent="0" lvl="0" marL="0" rtl="0" algn="l">
               <a:lnSpc>
-                <a:spcPct val="115000"/>
+                <a:spcPct val="105000"/>
               </a:lnSpc>
               <a:spcBef>
                 <a:spcPts val="1200"/>
@@ -10354,7 +10895,7 @@
               <a:spcAft>
                 <a:spcPts val="1200"/>
               </a:spcAft>
-              <a:buSzPct val="100000"/>
+              <a:buSzPts val="1665"/>
               <a:buNone/>
             </a:pPr>
             <a:r>
@@ -10730,13 +11271,12 @@
           <p:cNvPicPr preferRelativeResize="0"/>
           <p:nvPr/>
         </p:nvPicPr>
-        <p:blipFill>
+        <p:blipFill rotWithShape="1">
           <a:blip r:embed="rId3">
             <a:alphaModFix/>
           </a:blip>
-          <a:stretch>
-            <a:fillRect/>
-          </a:stretch>
+          <a:srcRect b="0" l="0" r="0" t="0"/>
+          <a:stretch/>
         </p:blipFill>
         <p:spPr>
           <a:xfrm>
@@ -11173,6 +11713,285 @@
 </file>
 
 <file path=ppt/theme/theme1.xml><?xml version="1.0" encoding="utf-8"?>
+<a:theme xmlns:a="http://schemas.openxmlformats.org/drawingml/2006/main" xmlns:r="http://schemas.openxmlformats.org/officeDocument/2006/relationships" name="Simple Light">
+  <a:themeElements>
+    <a:clrScheme name="Simple Light">
+      <a:dk1>
+        <a:srgbClr val="000000"/>
+      </a:dk1>
+      <a:lt1>
+        <a:srgbClr val="FFFFFF"/>
+      </a:lt1>
+      <a:dk2>
+        <a:srgbClr val="595959"/>
+      </a:dk2>
+      <a:lt2>
+        <a:srgbClr val="EEEEEE"/>
+      </a:lt2>
+      <a:accent1>
+        <a:srgbClr val="4285F4"/>
+      </a:accent1>
+      <a:accent2>
+        <a:srgbClr val="212121"/>
+      </a:accent2>
+      <a:accent3>
+        <a:srgbClr val="78909C"/>
+      </a:accent3>
+      <a:accent4>
+        <a:srgbClr val="FFAB40"/>
+      </a:accent4>
+      <a:accent5>
+        <a:srgbClr val="0097A7"/>
+      </a:accent5>
+      <a:accent6>
+        <a:srgbClr val="EEFF41"/>
+      </a:accent6>
+      <a:hlink>
+        <a:srgbClr val="0097A7"/>
+      </a:hlink>
+      <a:folHlink>
+        <a:srgbClr val="0097A7"/>
+      </a:folHlink>
+    </a:clrScheme>
+    <a:fontScheme name="Office">
+      <a:majorFont>
+        <a:latin typeface="Arial"/>
+        <a:ea typeface=""/>
+        <a:cs typeface=""/>
+        <a:font script="Jpan" typeface="ＭＳ Ｐゴシック"/>
+        <a:font script="Hang" typeface="맑은 고딕"/>
+        <a:font script="Hans" typeface="宋体"/>
+        <a:font script="Hant" typeface="新細明體"/>
+        <a:font script="Arab" typeface="Times New Roman"/>
+        <a:font script="Hebr" typeface="Times New Roman"/>
+        <a:font script="Thai" typeface="Angsana New"/>
+        <a:font script="Ethi" typeface="Nyala"/>
+        <a:font script="Beng" typeface="Vrinda"/>
+        <a:font script="Gujr" typeface="Shruti"/>
+        <a:font script="Khmr" typeface="MoolBoran"/>
+        <a:font script="Knda" typeface="Tunga"/>
+        <a:font script="Guru" typeface="Raavi"/>
+        <a:font script="Cans" typeface="Euphemia"/>
+        <a:font script="Cher" typeface="Plantagenet Cherokee"/>
+        <a:font script="Yiii" typeface="Microsoft Yi Baiti"/>
+        <a:font script="Tibt" typeface="Microsoft Himalaya"/>
+        <a:font script="Thaa" typeface="MV Boli"/>
+        <a:font script="Deva" typeface="Mangal"/>
+        <a:font script="Telu" typeface="Gautami"/>
+        <a:font script="Taml" typeface="Latha"/>
+        <a:font script="Syrc" typeface="Estrangelo Edessa"/>
+        <a:font script="Orya" typeface="Kalinga"/>
+        <a:font script="Mlym" typeface="Kartika"/>
+        <a:font script="Laoo" typeface="DokChampa"/>
+        <a:font script="Sinh" typeface="Iskoola Pota"/>
+        <a:font script="Mong" typeface="Mongolian Baiti"/>
+        <a:font script="Viet" typeface="Times New Roman"/>
+        <a:font script="Uigh" typeface="Microsoft Uighur"/>
+        <a:font script="Geor" typeface="Sylfaen"/>
+      </a:majorFont>
+      <a:minorFont>
+        <a:latin typeface="Arial"/>
+        <a:ea typeface=""/>
+        <a:cs typeface=""/>
+        <a:font script="Jpan" typeface="ＭＳ Ｐゴシック"/>
+        <a:font script="Hang" typeface="맑은 고딕"/>
+        <a:font script="Hans" typeface="宋体"/>
+        <a:font script="Hant" typeface="新細明體"/>
+        <a:font script="Arab" typeface="Arial"/>
+        <a:font script="Hebr" typeface="Arial"/>
+        <a:font script="Thai" typeface="Cordia New"/>
+        <a:font script="Ethi" typeface="Nyala"/>
+        <a:font script="Beng" typeface="Vrinda"/>
+        <a:font script="Gujr" typeface="Shruti"/>
+        <a:font script="Khmr" typeface="DaunPenh"/>
+        <a:font script="Knda" typeface="Tunga"/>
+        <a:font script="Guru" typeface="Raavi"/>
+        <a:font script="Cans" typeface="Euphemia"/>
+        <a:font script="Cher" typeface="Plantagenet Cherokee"/>
+        <a:font script="Yiii" typeface="Microsoft Yi Baiti"/>
+        <a:font script="Tibt" typeface="Microsoft Himalaya"/>
+        <a:font script="Thaa" typeface="MV Boli"/>
+        <a:font script="Deva" typeface="Mangal"/>
+        <a:font script="Telu" typeface="Gautami"/>
+        <a:font script="Taml" typeface="Latha"/>
+        <a:font script="Syrc" typeface="Estrangelo Edessa"/>
+        <a:font script="Orya" typeface="Kalinga"/>
+        <a:font script="Mlym" typeface="Kartika"/>
+        <a:font script="Laoo" typeface="DokChampa"/>
+        <a:font script="Sinh" typeface="Iskoola Pota"/>
+        <a:font script="Mong" typeface="Mongolian Baiti"/>
+        <a:font script="Viet" typeface="Arial"/>
+        <a:font script="Uigh" typeface="Microsoft Uighur"/>
+        <a:font script="Geor" typeface="Sylfaen"/>
+      </a:minorFont>
+    </a:fontScheme>
+    <a:fmtScheme name="Office">
+      <a:fillStyleLst>
+        <a:solidFill>
+          <a:schemeClr val="phClr"/>
+        </a:solidFill>
+        <a:gradFill rotWithShape="1">
+          <a:gsLst>
+            <a:gs pos="0">
+              <a:schemeClr val="phClr">
+                <a:tint val="50000"/>
+                <a:satMod val="300000"/>
+              </a:schemeClr>
+            </a:gs>
+            <a:gs pos="35000">
+              <a:schemeClr val="phClr">
+                <a:tint val="37000"/>
+                <a:satMod val="300000"/>
+              </a:schemeClr>
+            </a:gs>
+            <a:gs pos="100000">
+              <a:schemeClr val="phClr">
+                <a:tint val="15000"/>
+                <a:satMod val="350000"/>
+              </a:schemeClr>
+            </a:gs>
+          </a:gsLst>
+          <a:lin ang="16200000" scaled="1"/>
+        </a:gradFill>
+        <a:gradFill rotWithShape="1">
+          <a:gsLst>
+            <a:gs pos="0">
+              <a:schemeClr val="phClr">
+                <a:tint val="100000"/>
+                <a:shade val="100000"/>
+                <a:satMod val="130000"/>
+              </a:schemeClr>
+            </a:gs>
+            <a:gs pos="100000">
+              <a:schemeClr val="phClr">
+                <a:tint val="50000"/>
+                <a:shade val="100000"/>
+                <a:satMod val="350000"/>
+              </a:schemeClr>
+            </a:gs>
+          </a:gsLst>
+          <a:lin ang="16200000" scaled="0"/>
+        </a:gradFill>
+      </a:fillStyleLst>
+      <a:lnStyleLst>
+        <a:ln w="9525" cap="flat" cmpd="sng" algn="ctr">
+          <a:solidFill>
+            <a:schemeClr val="phClr">
+              <a:shade val="95000"/>
+              <a:satMod val="105000"/>
+            </a:schemeClr>
+          </a:solidFill>
+          <a:prstDash val="solid"/>
+        </a:ln>
+        <a:ln w="25400" cap="flat" cmpd="sng" algn="ctr">
+          <a:solidFill>
+            <a:schemeClr val="phClr"/>
+          </a:solidFill>
+          <a:prstDash val="solid"/>
+        </a:ln>
+        <a:ln w="38100" cap="flat" cmpd="sng" algn="ctr">
+          <a:solidFill>
+            <a:schemeClr val="phClr"/>
+          </a:solidFill>
+          <a:prstDash val="solid"/>
+        </a:ln>
+      </a:lnStyleLst>
+      <a:effectStyleLst>
+        <a:effectStyle>
+          <a:effectLst>
+            <a:outerShdw blurRad="40000" dist="20000" dir="5400000" rotWithShape="0">
+              <a:srgbClr val="000000">
+                <a:alpha val="38000"/>
+              </a:srgbClr>
+            </a:outerShdw>
+          </a:effectLst>
+        </a:effectStyle>
+        <a:effectStyle>
+          <a:effectLst>
+            <a:outerShdw blurRad="40000" dist="23000" dir="5400000" rotWithShape="0">
+              <a:srgbClr val="000000">
+                <a:alpha val="35000"/>
+              </a:srgbClr>
+            </a:outerShdw>
+          </a:effectLst>
+        </a:effectStyle>
+        <a:effectStyle>
+          <a:effectLst>
+            <a:outerShdw blurRad="40000" dist="23000" dir="5400000" rotWithShape="0">
+              <a:srgbClr val="000000">
+                <a:alpha val="35000"/>
+              </a:srgbClr>
+            </a:outerShdw>
+          </a:effectLst>
+          <a:scene3d>
+            <a:camera prst="orthographicFront">
+              <a:rot lat="0" lon="0" rev="0"/>
+            </a:camera>
+            <a:lightRig rig="threePt" dir="t">
+              <a:rot lat="0" lon="0" rev="1200000"/>
+            </a:lightRig>
+          </a:scene3d>
+          <a:sp3d>
+            <a:bevelT w="63500" h="25400"/>
+          </a:sp3d>
+        </a:effectStyle>
+      </a:effectStyleLst>
+      <a:bgFillStyleLst>
+        <a:solidFill>
+          <a:schemeClr val="phClr"/>
+        </a:solidFill>
+        <a:gradFill rotWithShape="1">
+          <a:gsLst>
+            <a:gs pos="0">
+              <a:schemeClr val="phClr">
+                <a:tint val="40000"/>
+                <a:satMod val="350000"/>
+              </a:schemeClr>
+            </a:gs>
+            <a:gs pos="40000">
+              <a:schemeClr val="phClr">
+                <a:tint val="45000"/>
+                <a:shade val="99000"/>
+                <a:satMod val="350000"/>
+              </a:schemeClr>
+            </a:gs>
+            <a:gs pos="100000">
+              <a:schemeClr val="phClr">
+                <a:shade val="20000"/>
+                <a:satMod val="255000"/>
+              </a:schemeClr>
+            </a:gs>
+          </a:gsLst>
+          <a:path path="circle">
+            <a:fillToRect l="50000" t="-80000" r="50000" b="180000"/>
+          </a:path>
+        </a:gradFill>
+        <a:gradFill rotWithShape="1">
+          <a:gsLst>
+            <a:gs pos="0">
+              <a:schemeClr val="phClr">
+                <a:tint val="80000"/>
+                <a:satMod val="300000"/>
+              </a:schemeClr>
+            </a:gs>
+            <a:gs pos="100000">
+              <a:schemeClr val="phClr">
+                <a:shade val="30000"/>
+                <a:satMod val="200000"/>
+              </a:schemeClr>
+            </a:gs>
+          </a:gsLst>
+          <a:path path="circle">
+            <a:fillToRect l="50000" t="50000" r="50000" b="50000"/>
+          </a:path>
+        </a:gradFill>
+      </a:bgFillStyleLst>
+    </a:fmtScheme>
+  </a:themeElements>
+</a:theme>
+</file>
+
+<file path=ppt/theme/theme2.xml><?xml version="1.0" encoding="utf-8"?>
 <a:theme xmlns:a="http://schemas.openxmlformats.org/drawingml/2006/main" xmlns:r="http://schemas.openxmlformats.org/officeDocument/2006/relationships">
   <a:themeElements>
     <a:clrScheme name="Default">
@@ -11449,283 +12268,4 @@
     </a:fmtScheme>
   </a:themeElements>
 </a:theme>
-</file>
-
-<file path=ppt/theme/theme2.xml><?xml version="1.0" encoding="utf-8"?>
-<a:theme xmlns:a="http://schemas.openxmlformats.org/drawingml/2006/main" xmlns:r="http://schemas.openxmlformats.org/officeDocument/2006/relationships" name="Simple Light">
-  <a:themeElements>
-    <a:clrScheme name="Simple Light">
-      <a:dk1>
-        <a:srgbClr val="000000"/>
-      </a:dk1>
-      <a:lt1>
-        <a:srgbClr val="FFFFFF"/>
-      </a:lt1>
-      <a:dk2>
-        <a:srgbClr val="595959"/>
-      </a:dk2>
-      <a:lt2>
-        <a:srgbClr val="EEEEEE"/>
-      </a:lt2>
-      <a:accent1>
-        <a:srgbClr val="4285F4"/>
-      </a:accent1>
-      <a:accent2>
-        <a:srgbClr val="212121"/>
-      </a:accent2>
-      <a:accent3>
-        <a:srgbClr val="78909C"/>
-      </a:accent3>
-      <a:accent4>
-        <a:srgbClr val="FFAB40"/>
-      </a:accent4>
-      <a:accent5>
-        <a:srgbClr val="0097A7"/>
-      </a:accent5>
-      <a:accent6>
-        <a:srgbClr val="EEFF41"/>
-      </a:accent6>
-      <a:hlink>
-        <a:srgbClr val="0097A7"/>
-      </a:hlink>
-      <a:folHlink>
-        <a:srgbClr val="0097A7"/>
-      </a:folHlink>
-    </a:clrScheme>
-    <a:fontScheme name="Office">
-      <a:majorFont>
-        <a:latin typeface="Arial"/>
-        <a:ea typeface=""/>
-        <a:cs typeface=""/>
-        <a:font script="Jpan" typeface="ＭＳ Ｐゴシック"/>
-        <a:font script="Hang" typeface="맑은 고딕"/>
-        <a:font script="Hans" typeface="宋体"/>
-        <a:font script="Hant" typeface="新細明體"/>
-        <a:font script="Arab" typeface="Times New Roman"/>
-        <a:font script="Hebr" typeface="Times New Roman"/>
-        <a:font script="Thai" typeface="Angsana New"/>
-        <a:font script="Ethi" typeface="Nyala"/>
-        <a:font script="Beng" typeface="Vrinda"/>
-        <a:font script="Gujr" typeface="Shruti"/>
-        <a:font script="Khmr" typeface="MoolBoran"/>
-        <a:font script="Knda" typeface="Tunga"/>
-        <a:font script="Guru" typeface="Raavi"/>
-        <a:font script="Cans" typeface="Euphemia"/>
-        <a:font script="Cher" typeface="Plantagenet Cherokee"/>
-        <a:font script="Yiii" typeface="Microsoft Yi Baiti"/>
-        <a:font script="Tibt" typeface="Microsoft Himalaya"/>
-        <a:font script="Thaa" typeface="MV Boli"/>
-        <a:font script="Deva" typeface="Mangal"/>
-        <a:font script="Telu" typeface="Gautami"/>
-        <a:font script="Taml" typeface="Latha"/>
-        <a:font script="Syrc" typeface="Estrangelo Edessa"/>
-        <a:font script="Orya" typeface="Kalinga"/>
-        <a:font script="Mlym" typeface="Kartika"/>
-        <a:font script="Laoo" typeface="DokChampa"/>
-        <a:font script="Sinh" typeface="Iskoola Pota"/>
-        <a:font script="Mong" typeface="Mongolian Baiti"/>
-        <a:font script="Viet" typeface="Times New Roman"/>
-        <a:font script="Uigh" typeface="Microsoft Uighur"/>
-        <a:font script="Geor" typeface="Sylfaen"/>
-      </a:majorFont>
-      <a:minorFont>
-        <a:latin typeface="Arial"/>
-        <a:ea typeface=""/>
-        <a:cs typeface=""/>
-        <a:font script="Jpan" typeface="ＭＳ Ｐゴシック"/>
-        <a:font script="Hang" typeface="맑은 고딕"/>
-        <a:font script="Hans" typeface="宋体"/>
-        <a:font script="Hant" typeface="新細明體"/>
-        <a:font script="Arab" typeface="Arial"/>
-        <a:font script="Hebr" typeface="Arial"/>
-        <a:font script="Thai" typeface="Cordia New"/>
-        <a:font script="Ethi" typeface="Nyala"/>
-        <a:font script="Beng" typeface="Vrinda"/>
-        <a:font script="Gujr" typeface="Shruti"/>
-        <a:font script="Khmr" typeface="DaunPenh"/>
-        <a:font script="Knda" typeface="Tunga"/>
-        <a:font script="Guru" typeface="Raavi"/>
-        <a:font script="Cans" typeface="Euphemia"/>
-        <a:font script="Cher" typeface="Plantagenet Cherokee"/>
-        <a:font script="Yiii" typeface="Microsoft Yi Baiti"/>
-        <a:font script="Tibt" typeface="Microsoft Himalaya"/>
-        <a:font script="Thaa" typeface="MV Boli"/>
-        <a:font script="Deva" typeface="Mangal"/>
-        <a:font script="Telu" typeface="Gautami"/>
-        <a:font script="Taml" typeface="Latha"/>
-        <a:font script="Syrc" typeface="Estrangelo Edessa"/>
-        <a:font script="Orya" typeface="Kalinga"/>
-        <a:font script="Mlym" typeface="Kartika"/>
-        <a:font script="Laoo" typeface="DokChampa"/>
-        <a:font script="Sinh" typeface="Iskoola Pota"/>
-        <a:font script="Mong" typeface="Mongolian Baiti"/>
-        <a:font script="Viet" typeface="Arial"/>
-        <a:font script="Uigh" typeface="Microsoft Uighur"/>
-        <a:font script="Geor" typeface="Sylfaen"/>
-      </a:minorFont>
-    </a:fontScheme>
-    <a:fmtScheme name="Office">
-      <a:fillStyleLst>
-        <a:solidFill>
-          <a:schemeClr val="phClr"/>
-        </a:solidFill>
-        <a:gradFill rotWithShape="1">
-          <a:gsLst>
-            <a:gs pos="0">
-              <a:schemeClr val="phClr">
-                <a:tint val="50000"/>
-                <a:satMod val="300000"/>
-              </a:schemeClr>
-            </a:gs>
-            <a:gs pos="35000">
-              <a:schemeClr val="phClr">
-                <a:tint val="37000"/>
-                <a:satMod val="300000"/>
-              </a:schemeClr>
-            </a:gs>
-            <a:gs pos="100000">
-              <a:schemeClr val="phClr">
-                <a:tint val="15000"/>
-                <a:satMod val="350000"/>
-              </a:schemeClr>
-            </a:gs>
-          </a:gsLst>
-          <a:lin ang="16200000" scaled="1"/>
-        </a:gradFill>
-        <a:gradFill rotWithShape="1">
-          <a:gsLst>
-            <a:gs pos="0">
-              <a:schemeClr val="phClr">
-                <a:tint val="100000"/>
-                <a:shade val="100000"/>
-                <a:satMod val="130000"/>
-              </a:schemeClr>
-            </a:gs>
-            <a:gs pos="100000">
-              <a:schemeClr val="phClr">
-                <a:tint val="50000"/>
-                <a:shade val="100000"/>
-                <a:satMod val="350000"/>
-              </a:schemeClr>
-            </a:gs>
-          </a:gsLst>
-          <a:lin ang="16200000" scaled="0"/>
-        </a:gradFill>
-      </a:fillStyleLst>
-      <a:lnStyleLst>
-        <a:ln w="9525" cap="flat" cmpd="sng" algn="ctr">
-          <a:solidFill>
-            <a:schemeClr val="phClr">
-              <a:shade val="95000"/>
-              <a:satMod val="105000"/>
-            </a:schemeClr>
-          </a:solidFill>
-          <a:prstDash val="solid"/>
-        </a:ln>
-        <a:ln w="25400" cap="flat" cmpd="sng" algn="ctr">
-          <a:solidFill>
-            <a:schemeClr val="phClr"/>
-          </a:solidFill>
-          <a:prstDash val="solid"/>
-        </a:ln>
-        <a:ln w="38100" cap="flat" cmpd="sng" algn="ctr">
-          <a:solidFill>
-            <a:schemeClr val="phClr"/>
-          </a:solidFill>
-          <a:prstDash val="solid"/>
-        </a:ln>
-      </a:lnStyleLst>
-      <a:effectStyleLst>
-        <a:effectStyle>
-          <a:effectLst>
-            <a:outerShdw blurRad="40000" dist="20000" dir="5400000" rotWithShape="0">
-              <a:srgbClr val="000000">
-                <a:alpha val="38000"/>
-              </a:srgbClr>
-            </a:outerShdw>
-          </a:effectLst>
-        </a:effectStyle>
-        <a:effectStyle>
-          <a:effectLst>
-            <a:outerShdw blurRad="40000" dist="23000" dir="5400000" rotWithShape="0">
-              <a:srgbClr val="000000">
-                <a:alpha val="35000"/>
-              </a:srgbClr>
-            </a:outerShdw>
-          </a:effectLst>
-        </a:effectStyle>
-        <a:effectStyle>
-          <a:effectLst>
-            <a:outerShdw blurRad="40000" dist="23000" dir="5400000" rotWithShape="0">
-              <a:srgbClr val="000000">
-                <a:alpha val="35000"/>
-              </a:srgbClr>
-            </a:outerShdw>
-          </a:effectLst>
-          <a:scene3d>
-            <a:camera prst="orthographicFront">
-              <a:rot lat="0" lon="0" rev="0"/>
-            </a:camera>
-            <a:lightRig rig="threePt" dir="t">
-              <a:rot lat="0" lon="0" rev="1200000"/>
-            </a:lightRig>
-          </a:scene3d>
-          <a:sp3d>
-            <a:bevelT w="63500" h="25400"/>
-          </a:sp3d>
-        </a:effectStyle>
-      </a:effectStyleLst>
-      <a:bgFillStyleLst>
-        <a:solidFill>
-          <a:schemeClr val="phClr"/>
-        </a:solidFill>
-        <a:gradFill rotWithShape="1">
-          <a:gsLst>
-            <a:gs pos="0">
-              <a:schemeClr val="phClr">
-                <a:tint val="40000"/>
-                <a:satMod val="350000"/>
-              </a:schemeClr>
-            </a:gs>
-            <a:gs pos="40000">
-              <a:schemeClr val="phClr">
-                <a:tint val="45000"/>
-                <a:shade val="99000"/>
-                <a:satMod val="350000"/>
-              </a:schemeClr>
-            </a:gs>
-            <a:gs pos="100000">
-              <a:schemeClr val="phClr">
-                <a:shade val="20000"/>
-                <a:satMod val="255000"/>
-              </a:schemeClr>
-            </a:gs>
-          </a:gsLst>
-          <a:path path="circle">
-            <a:fillToRect l="50000" t="-80000" r="50000" b="180000"/>
-          </a:path>
-        </a:gradFill>
-        <a:gradFill rotWithShape="1">
-          <a:gsLst>
-            <a:gs pos="0">
-              <a:schemeClr val="phClr">
-                <a:tint val="80000"/>
-                <a:satMod val="300000"/>
-              </a:schemeClr>
-            </a:gs>
-            <a:gs pos="100000">
-              <a:schemeClr val="phClr">
-                <a:shade val="30000"/>
-                <a:satMod val="200000"/>
-              </a:schemeClr>
-            </a:gs>
-          </a:gsLst>
-          <a:path path="circle">
-            <a:fillToRect l="50000" t="50000" r="50000" b="50000"/>
-          </a:path>
-        </a:gradFill>
-      </a:bgFillStyleLst>
-    </a:fmtScheme>
-  </a:themeElements>
-</a:theme>
 </file>
</xml_diff>